<commit_message>
1. Correção de bugs 2. Documentação para apresentação Apresentação para MVPs 04 + 05
</commit_message>
<xml_diff>
--- a/documentation/MVP - Tic Tac Toe.pptx
+++ b/documentation/MVP - Tic Tac Toe.pptx
@@ -7,7 +7,7 @@
     <p:sldMasterId id="2147483702" r:id="rId3"/>
   </p:sldMasterIdLst>
   <p:notesMasterIdLst>
-    <p:notesMasterId r:id="rId14"/>
+    <p:notesMasterId r:id="rId16"/>
   </p:notesMasterIdLst>
   <p:sldIdLst>
     <p:sldId id="268" r:id="rId4"/>
@@ -19,7 +19,9 @@
     <p:sldId id="272" r:id="rId10"/>
     <p:sldId id="273" r:id="rId11"/>
     <p:sldId id="274" r:id="rId12"/>
-    <p:sldId id="269" r:id="rId13"/>
+    <p:sldId id="277" r:id="rId13"/>
+    <p:sldId id="278" r:id="rId14"/>
+    <p:sldId id="269" r:id="rId15"/>
   </p:sldIdLst>
   <p:sldSz cx="12192000" cy="6858000"/>
   <p:notesSz cx="6858000" cy="9144000"/>
@@ -132,6 +134,8 @@
             <p14:sldId id="272"/>
             <p14:sldId id="273"/>
             <p14:sldId id="274"/>
+            <p14:sldId id="277"/>
+            <p14:sldId id="278"/>
           </p14:sldIdLst>
         </p14:section>
         <p14:section name="Untitled Section" id="{6079A5A3-19BA-42B3-A015-0823992490C3}">
@@ -150,101 +154,6 @@
 
 <file path=ppt/changesInfos/changesInfo1.xml><?xml version="1.0" encoding="utf-8"?>
 <pc:chgInfo xmlns:a="http://schemas.openxmlformats.org/drawingml/2006/main" xmlns:r="http://schemas.openxmlformats.org/officeDocument/2006/relationships" xmlns:ac="http://schemas.microsoft.com/office/drawing/2013/main/command" xmlns:pc="http://schemas.microsoft.com/office/powerpoint/2013/main/command">
-  <pc:docChgLst>
-    <pc:chgData name="Ligia Ferreira" userId="504e06ff-651d-48a1-9fb1-9060b17f34e5" providerId="ADAL" clId="{0202E206-7F38-47D6-B1D6-2743B6588EA5}"/>
-    <pc:docChg chg="custSel addSld delSld modSld modSection">
-      <pc:chgData name="Ligia Ferreira" userId="504e06ff-651d-48a1-9fb1-9060b17f34e5" providerId="ADAL" clId="{0202E206-7F38-47D6-B1D6-2743B6588EA5}" dt="2018-03-12T19:30:46.917" v="123"/>
-      <pc:docMkLst>
-        <pc:docMk/>
-      </pc:docMkLst>
-      <pc:sldChg chg="modNotesTx">
-        <pc:chgData name="Ligia Ferreira" userId="504e06ff-651d-48a1-9fb1-9060b17f34e5" providerId="ADAL" clId="{0202E206-7F38-47D6-B1D6-2743B6588EA5}" dt="2018-03-12T19:30:37.602" v="121" actId="20577"/>
-        <pc:sldMkLst>
-          <pc:docMk/>
-          <pc:sldMk cId="3112115938" sldId="262"/>
-        </pc:sldMkLst>
-      </pc:sldChg>
-      <pc:sldChg chg="addSp delSp modSp add">
-        <pc:chgData name="Ligia Ferreira" userId="504e06ff-651d-48a1-9fb1-9060b17f34e5" providerId="ADAL" clId="{0202E206-7F38-47D6-B1D6-2743B6588EA5}" dt="2018-03-12T19:30:46.917" v="123"/>
-        <pc:sldMkLst>
-          <pc:docMk/>
-          <pc:sldMk cId="4059635202" sldId="272"/>
-        </pc:sldMkLst>
-        <pc:spChg chg="mod">
-          <ac:chgData name="Ligia Ferreira" userId="504e06ff-651d-48a1-9fb1-9060b17f34e5" providerId="ADAL" clId="{0202E206-7F38-47D6-B1D6-2743B6588EA5}" dt="2018-03-12T17:30:21.547" v="24" actId="20577"/>
-          <ac:spMkLst>
-            <pc:docMk/>
-            <pc:sldMk cId="4059635202" sldId="272"/>
-            <ac:spMk id="2" creationId="{00000000-0000-0000-0000-000000000000}"/>
-          </ac:spMkLst>
-        </pc:spChg>
-        <pc:spChg chg="add del">
-          <ac:chgData name="Ligia Ferreira" userId="504e06ff-651d-48a1-9fb1-9060b17f34e5" providerId="ADAL" clId="{0202E206-7F38-47D6-B1D6-2743B6588EA5}" dt="2018-03-12T19:30:46.917" v="123"/>
-          <ac:spMkLst>
-            <pc:docMk/>
-            <pc:sldMk cId="4059635202" sldId="272"/>
-            <ac:spMk id="3" creationId="{462B1E0E-20AD-47AD-BE12-589BF737D2CA}"/>
-          </ac:spMkLst>
-        </pc:spChg>
-        <pc:spChg chg="mod">
-          <ac:chgData name="Ligia Ferreira" userId="504e06ff-651d-48a1-9fb1-9060b17f34e5" providerId="ADAL" clId="{0202E206-7F38-47D6-B1D6-2743B6588EA5}" dt="2018-03-12T17:30:39.219" v="91" actId="20577"/>
-          <ac:spMkLst>
-            <pc:docMk/>
-            <pc:sldMk cId="4059635202" sldId="272"/>
-            <ac:spMk id="4" creationId="{00000000-0000-0000-0000-000000000000}"/>
-          </ac:spMkLst>
-        </pc:spChg>
-        <pc:picChg chg="add del mod">
-          <ac:chgData name="Ligia Ferreira" userId="504e06ff-651d-48a1-9fb1-9060b17f34e5" providerId="ADAL" clId="{0202E206-7F38-47D6-B1D6-2743B6588EA5}" dt="2018-03-12T17:31:39.365" v="97" actId="478"/>
-          <ac:picMkLst>
-            <pc:docMk/>
-            <pc:sldMk cId="4059635202" sldId="272"/>
-            <ac:picMk id="3" creationId="{C72447D8-6977-447E-9FBD-D7DB5BD20879}"/>
-          </ac:picMkLst>
-        </pc:picChg>
-        <pc:picChg chg="del">
-          <ac:chgData name="Ligia Ferreira" userId="504e06ff-651d-48a1-9fb1-9060b17f34e5" providerId="ADAL" clId="{0202E206-7F38-47D6-B1D6-2743B6588EA5}" dt="2018-03-12T17:30:41.862" v="92" actId="478"/>
-          <ac:picMkLst>
-            <pc:docMk/>
-            <pc:sldMk cId="4059635202" sldId="272"/>
-            <ac:picMk id="5" creationId="{FD0F94DF-DCB7-4E4D-847D-825BDCAFC65C}"/>
-          </ac:picMkLst>
-        </pc:picChg>
-        <pc:picChg chg="mod">
-          <ac:chgData name="Ligia Ferreira" userId="504e06ff-651d-48a1-9fb1-9060b17f34e5" providerId="ADAL" clId="{0202E206-7F38-47D6-B1D6-2743B6588EA5}" dt="2018-03-12T17:30:49.258" v="94" actId="1076"/>
-          <ac:picMkLst>
-            <pc:docMk/>
-            <pc:sldMk cId="4059635202" sldId="272"/>
-            <ac:picMk id="6" creationId="{71946CE4-018D-4110-AD68-6836CDA6E7AD}"/>
-          </ac:picMkLst>
-        </pc:picChg>
-        <pc:picChg chg="add mod">
-          <ac:chgData name="Ligia Ferreira" userId="504e06ff-651d-48a1-9fb1-9060b17f34e5" providerId="ADAL" clId="{0202E206-7F38-47D6-B1D6-2743B6588EA5}" dt="2018-03-12T17:33:23.466" v="112" actId="1076"/>
-          <ac:picMkLst>
-            <pc:docMk/>
-            <pc:sldMk cId="4059635202" sldId="272"/>
-            <ac:picMk id="7" creationId="{48671A63-2B9C-4B92-A115-92DCCE9832F5}"/>
-          </ac:picMkLst>
-        </pc:picChg>
-        <pc:picChg chg="add mod">
-          <ac:chgData name="Ligia Ferreira" userId="504e06ff-651d-48a1-9fb1-9060b17f34e5" providerId="ADAL" clId="{0202E206-7F38-47D6-B1D6-2743B6588EA5}" dt="2018-03-12T17:33:36.754" v="119" actId="1076"/>
-          <ac:picMkLst>
-            <pc:docMk/>
-            <pc:sldMk cId="4059635202" sldId="272"/>
-            <ac:picMk id="8" creationId="{07ADEC16-BCA9-4EFD-9C7D-5F4146F2A38B}"/>
-          </ac:picMkLst>
-        </pc:picChg>
-        <pc:picChg chg="add mod">
-          <ac:chgData name="Ligia Ferreira" userId="504e06ff-651d-48a1-9fb1-9060b17f34e5" providerId="ADAL" clId="{0202E206-7F38-47D6-B1D6-2743B6588EA5}" dt="2018-03-12T17:33:38.187" v="120" actId="1076"/>
-          <ac:picMkLst>
-            <pc:docMk/>
-            <pc:sldMk cId="4059635202" sldId="272"/>
-            <ac:picMk id="9" creationId="{27954285-3C17-4D14-ABD6-31EA8B22FB3E}"/>
-          </ac:picMkLst>
-        </pc:picChg>
-      </pc:sldChg>
-    </pc:docChg>
-  </pc:docChgLst>
   <pc:docChgLst>
     <pc:chgData name="Ligia Ferreira" userId="504e06ff-651d-48a1-9fb1-9060b17f34e5" providerId="ADAL" clId="{A8996255-89BD-4948-8B88-CE63F3DD249D}"/>
     <pc:docChg chg="custSel delSld modSld modSection">
@@ -548,6 +457,101 @@
             <pc:docMk/>
             <pc:sldMk cId="3769967691" sldId="270"/>
             <ac:picMk id="26" creationId="{00000000-0000-0000-0000-000000000000}"/>
+          </ac:picMkLst>
+        </pc:picChg>
+      </pc:sldChg>
+    </pc:docChg>
+  </pc:docChgLst>
+  <pc:docChgLst>
+    <pc:chgData name="Ligia Ferreira" userId="504e06ff-651d-48a1-9fb1-9060b17f34e5" providerId="ADAL" clId="{0202E206-7F38-47D6-B1D6-2743B6588EA5}"/>
+    <pc:docChg chg="custSel addSld delSld modSld modSection">
+      <pc:chgData name="Ligia Ferreira" userId="504e06ff-651d-48a1-9fb1-9060b17f34e5" providerId="ADAL" clId="{0202E206-7F38-47D6-B1D6-2743B6588EA5}" dt="2018-03-12T19:30:46.917" v="123"/>
+      <pc:docMkLst>
+        <pc:docMk/>
+      </pc:docMkLst>
+      <pc:sldChg chg="modNotesTx">
+        <pc:chgData name="Ligia Ferreira" userId="504e06ff-651d-48a1-9fb1-9060b17f34e5" providerId="ADAL" clId="{0202E206-7F38-47D6-B1D6-2743B6588EA5}" dt="2018-03-12T19:30:37.602" v="121" actId="20577"/>
+        <pc:sldMkLst>
+          <pc:docMk/>
+          <pc:sldMk cId="3112115938" sldId="262"/>
+        </pc:sldMkLst>
+      </pc:sldChg>
+      <pc:sldChg chg="addSp delSp modSp add">
+        <pc:chgData name="Ligia Ferreira" userId="504e06ff-651d-48a1-9fb1-9060b17f34e5" providerId="ADAL" clId="{0202E206-7F38-47D6-B1D6-2743B6588EA5}" dt="2018-03-12T19:30:46.917" v="123"/>
+        <pc:sldMkLst>
+          <pc:docMk/>
+          <pc:sldMk cId="4059635202" sldId="272"/>
+        </pc:sldMkLst>
+        <pc:spChg chg="mod">
+          <ac:chgData name="Ligia Ferreira" userId="504e06ff-651d-48a1-9fb1-9060b17f34e5" providerId="ADAL" clId="{0202E206-7F38-47D6-B1D6-2743B6588EA5}" dt="2018-03-12T17:30:21.547" v="24" actId="20577"/>
+          <ac:spMkLst>
+            <pc:docMk/>
+            <pc:sldMk cId="4059635202" sldId="272"/>
+            <ac:spMk id="2" creationId="{00000000-0000-0000-0000-000000000000}"/>
+          </ac:spMkLst>
+        </pc:spChg>
+        <pc:spChg chg="add del">
+          <ac:chgData name="Ligia Ferreira" userId="504e06ff-651d-48a1-9fb1-9060b17f34e5" providerId="ADAL" clId="{0202E206-7F38-47D6-B1D6-2743B6588EA5}" dt="2018-03-12T19:30:46.917" v="123"/>
+          <ac:spMkLst>
+            <pc:docMk/>
+            <pc:sldMk cId="4059635202" sldId="272"/>
+            <ac:spMk id="3" creationId="{462B1E0E-20AD-47AD-BE12-589BF737D2CA}"/>
+          </ac:spMkLst>
+        </pc:spChg>
+        <pc:spChg chg="mod">
+          <ac:chgData name="Ligia Ferreira" userId="504e06ff-651d-48a1-9fb1-9060b17f34e5" providerId="ADAL" clId="{0202E206-7F38-47D6-B1D6-2743B6588EA5}" dt="2018-03-12T17:30:39.219" v="91" actId="20577"/>
+          <ac:spMkLst>
+            <pc:docMk/>
+            <pc:sldMk cId="4059635202" sldId="272"/>
+            <ac:spMk id="4" creationId="{00000000-0000-0000-0000-000000000000}"/>
+          </ac:spMkLst>
+        </pc:spChg>
+        <pc:picChg chg="add del mod">
+          <ac:chgData name="Ligia Ferreira" userId="504e06ff-651d-48a1-9fb1-9060b17f34e5" providerId="ADAL" clId="{0202E206-7F38-47D6-B1D6-2743B6588EA5}" dt="2018-03-12T17:31:39.365" v="97" actId="478"/>
+          <ac:picMkLst>
+            <pc:docMk/>
+            <pc:sldMk cId="4059635202" sldId="272"/>
+            <ac:picMk id="3" creationId="{C72447D8-6977-447E-9FBD-D7DB5BD20879}"/>
+          </ac:picMkLst>
+        </pc:picChg>
+        <pc:picChg chg="del">
+          <ac:chgData name="Ligia Ferreira" userId="504e06ff-651d-48a1-9fb1-9060b17f34e5" providerId="ADAL" clId="{0202E206-7F38-47D6-B1D6-2743B6588EA5}" dt="2018-03-12T17:30:41.862" v="92" actId="478"/>
+          <ac:picMkLst>
+            <pc:docMk/>
+            <pc:sldMk cId="4059635202" sldId="272"/>
+            <ac:picMk id="5" creationId="{FD0F94DF-DCB7-4E4D-847D-825BDCAFC65C}"/>
+          </ac:picMkLst>
+        </pc:picChg>
+        <pc:picChg chg="mod">
+          <ac:chgData name="Ligia Ferreira" userId="504e06ff-651d-48a1-9fb1-9060b17f34e5" providerId="ADAL" clId="{0202E206-7F38-47D6-B1D6-2743B6588EA5}" dt="2018-03-12T17:30:49.258" v="94" actId="1076"/>
+          <ac:picMkLst>
+            <pc:docMk/>
+            <pc:sldMk cId="4059635202" sldId="272"/>
+            <ac:picMk id="6" creationId="{71946CE4-018D-4110-AD68-6836CDA6E7AD}"/>
+          </ac:picMkLst>
+        </pc:picChg>
+        <pc:picChg chg="add mod">
+          <ac:chgData name="Ligia Ferreira" userId="504e06ff-651d-48a1-9fb1-9060b17f34e5" providerId="ADAL" clId="{0202E206-7F38-47D6-B1D6-2743B6588EA5}" dt="2018-03-12T17:33:23.466" v="112" actId="1076"/>
+          <ac:picMkLst>
+            <pc:docMk/>
+            <pc:sldMk cId="4059635202" sldId="272"/>
+            <ac:picMk id="7" creationId="{48671A63-2B9C-4B92-A115-92DCCE9832F5}"/>
+          </ac:picMkLst>
+        </pc:picChg>
+        <pc:picChg chg="add mod">
+          <ac:chgData name="Ligia Ferreira" userId="504e06ff-651d-48a1-9fb1-9060b17f34e5" providerId="ADAL" clId="{0202E206-7F38-47D6-B1D6-2743B6588EA5}" dt="2018-03-12T17:33:36.754" v="119" actId="1076"/>
+          <ac:picMkLst>
+            <pc:docMk/>
+            <pc:sldMk cId="4059635202" sldId="272"/>
+            <ac:picMk id="8" creationId="{07ADEC16-BCA9-4EFD-9C7D-5F4146F2A38B}"/>
+          </ac:picMkLst>
+        </pc:picChg>
+        <pc:picChg chg="add mod">
+          <ac:chgData name="Ligia Ferreira" userId="504e06ff-651d-48a1-9fb1-9060b17f34e5" providerId="ADAL" clId="{0202E206-7F38-47D6-B1D6-2743B6588EA5}" dt="2018-03-12T17:33:38.187" v="120" actId="1076"/>
+          <ac:picMkLst>
+            <pc:docMk/>
+            <pc:sldMk cId="4059635202" sldId="272"/>
+            <ac:picMk id="9" creationId="{27954285-3C17-4D14-ABD6-31EA8B22FB3E}"/>
           </ac:picMkLst>
         </pc:picChg>
       </pc:sldChg>
@@ -9223,7 +9227,7 @@
           <a:p>
             <a:fld id="{BAC0F208-0698-41B8-BDE8-AE6BC3AEB68A}" type="datetimeFigureOut">
               <a:rPr lang="pt-BR" smtClean="0"/>
-              <a:t>22/03/2018</a:t>
+              <a:t>11/05/2018</a:t>
             </a:fld>
             <a:endParaRPr lang="pt-BR"/>
           </a:p>
@@ -9863,6 +9867,202 @@
 </p:notes>
 </file>
 
+<file path=ppt/notesSlides/notesSlide5.xml><?xml version="1.0" encoding="utf-8"?>
+<p:notes xmlns:a="http://schemas.openxmlformats.org/drawingml/2006/main" xmlns:r="http://schemas.openxmlformats.org/officeDocument/2006/relationships" xmlns:p="http://schemas.openxmlformats.org/presentationml/2006/main">
+  <p:cSld>
+    <p:spTree>
+      <p:nvGrpSpPr>
+        <p:cNvPr id="1" name=""/>
+        <p:cNvGrpSpPr/>
+        <p:nvPr/>
+      </p:nvGrpSpPr>
+      <p:grpSpPr>
+        <a:xfrm>
+          <a:off x="0" y="0"/>
+          <a:ext cx="0" cy="0"/>
+          <a:chOff x="0" y="0"/>
+          <a:chExt cx="0" cy="0"/>
+        </a:xfrm>
+      </p:grpSpPr>
+      <p:sp>
+        <p:nvSpPr>
+          <p:cNvPr id="2" name="Espaço Reservado para Imagem de Slide 1"/>
+          <p:cNvSpPr>
+            <a:spLocks noGrp="1" noRot="1" noChangeAspect="1"/>
+          </p:cNvSpPr>
+          <p:nvPr>
+            <p:ph type="sldImg"/>
+          </p:nvPr>
+        </p:nvSpPr>
+        <p:spPr/>
+      </p:sp>
+      <p:sp>
+        <p:nvSpPr>
+          <p:cNvPr id="3" name="Espaço Reservado para Anotações 2"/>
+          <p:cNvSpPr>
+            <a:spLocks noGrp="1"/>
+          </p:cNvSpPr>
+          <p:nvPr>
+            <p:ph type="body" idx="1"/>
+          </p:nvPr>
+        </p:nvSpPr>
+        <p:spPr/>
+        <p:txBody>
+          <a:bodyPr/>
+          <a:lstStyle/>
+          <a:p>
+            <a:r>
+              <a:rPr lang="pt-BR" dirty="0"/>
+              <a:t>Fazer com que o cliente visualize uma parte do jogo finalizada (três dificuldades contra a máquina) e cumprir requisito de </a:t>
+            </a:r>
+            <a:r>
+              <a:rPr lang="pt-BR" dirty="0" err="1"/>
+              <a:t>login</a:t>
+            </a:r>
+            <a:r>
+              <a:rPr lang="pt-BR" dirty="0"/>
+              <a:t>, tornando o jogo mais pessoal e amigável para o jogador</a:t>
+            </a:r>
+          </a:p>
+          <a:p>
+            <a:endParaRPr lang="pt-BR" dirty="0"/>
+          </a:p>
+        </p:txBody>
+      </p:sp>
+      <p:sp>
+        <p:nvSpPr>
+          <p:cNvPr id="4" name="Espaço Reservado para Número de Slide 3"/>
+          <p:cNvSpPr>
+            <a:spLocks noGrp="1"/>
+          </p:cNvSpPr>
+          <p:nvPr>
+            <p:ph type="sldNum" sz="quarter" idx="10"/>
+          </p:nvPr>
+        </p:nvSpPr>
+        <p:spPr/>
+        <p:txBody>
+          <a:bodyPr/>
+          <a:lstStyle/>
+          <a:p>
+            <a:fld id="{CF4D8C66-CD72-4651-ABA9-05CE53648962}" type="slidenum">
+              <a:rPr lang="pt-BR" smtClean="0"/>
+              <a:t>10</a:t>
+            </a:fld>
+            <a:endParaRPr lang="pt-BR"/>
+          </a:p>
+        </p:txBody>
+      </p:sp>
+    </p:spTree>
+    <p:extLst>
+      <p:ext uri="{BB962C8B-B14F-4D97-AF65-F5344CB8AC3E}">
+        <p14:creationId xmlns:p14="http://schemas.microsoft.com/office/powerpoint/2010/main" val="3290782892"/>
+      </p:ext>
+    </p:extLst>
+  </p:cSld>
+  <p:clrMapOvr>
+    <a:masterClrMapping/>
+  </p:clrMapOvr>
+</p:notes>
+</file>
+
+<file path=ppt/notesSlides/notesSlide6.xml><?xml version="1.0" encoding="utf-8"?>
+<p:notes xmlns:a="http://schemas.openxmlformats.org/drawingml/2006/main" xmlns:r="http://schemas.openxmlformats.org/officeDocument/2006/relationships" xmlns:p="http://schemas.openxmlformats.org/presentationml/2006/main">
+  <p:cSld>
+    <p:spTree>
+      <p:nvGrpSpPr>
+        <p:cNvPr id="1" name=""/>
+        <p:cNvGrpSpPr/>
+        <p:nvPr/>
+      </p:nvGrpSpPr>
+      <p:grpSpPr>
+        <a:xfrm>
+          <a:off x="0" y="0"/>
+          <a:ext cx="0" cy="0"/>
+          <a:chOff x="0" y="0"/>
+          <a:chExt cx="0" cy="0"/>
+        </a:xfrm>
+      </p:grpSpPr>
+      <p:sp>
+        <p:nvSpPr>
+          <p:cNvPr id="2" name="Espaço Reservado para Imagem de Slide 1"/>
+          <p:cNvSpPr>
+            <a:spLocks noGrp="1" noRot="1" noChangeAspect="1"/>
+          </p:cNvSpPr>
+          <p:nvPr>
+            <p:ph type="sldImg"/>
+          </p:nvPr>
+        </p:nvSpPr>
+        <p:spPr/>
+      </p:sp>
+      <p:sp>
+        <p:nvSpPr>
+          <p:cNvPr id="3" name="Espaço Reservado para Anotações 2"/>
+          <p:cNvSpPr>
+            <a:spLocks noGrp="1"/>
+          </p:cNvSpPr>
+          <p:nvPr>
+            <p:ph type="body" idx="1"/>
+          </p:nvPr>
+        </p:nvSpPr>
+        <p:spPr/>
+        <p:txBody>
+          <a:bodyPr/>
+          <a:lstStyle/>
+          <a:p>
+            <a:r>
+              <a:rPr lang="pt-BR" dirty="0"/>
+              <a:t>Fazer com que o cliente visualize uma parte do jogo finalizada (três dificuldades contra a máquina) e cumprir requisito de </a:t>
+            </a:r>
+            <a:r>
+              <a:rPr lang="pt-BR" dirty="0" err="1"/>
+              <a:t>login</a:t>
+            </a:r>
+            <a:r>
+              <a:rPr lang="pt-BR" dirty="0"/>
+              <a:t>, tornando o jogo mais pessoal e amigável para o jogador</a:t>
+            </a:r>
+          </a:p>
+          <a:p>
+            <a:endParaRPr lang="pt-BR" dirty="0"/>
+          </a:p>
+        </p:txBody>
+      </p:sp>
+      <p:sp>
+        <p:nvSpPr>
+          <p:cNvPr id="4" name="Espaço Reservado para Número de Slide 3"/>
+          <p:cNvSpPr>
+            <a:spLocks noGrp="1"/>
+          </p:cNvSpPr>
+          <p:nvPr>
+            <p:ph type="sldNum" sz="quarter" idx="10"/>
+          </p:nvPr>
+        </p:nvSpPr>
+        <p:spPr/>
+        <p:txBody>
+          <a:bodyPr/>
+          <a:lstStyle/>
+          <a:p>
+            <a:fld id="{CF4D8C66-CD72-4651-ABA9-05CE53648962}" type="slidenum">
+              <a:rPr lang="pt-BR" smtClean="0"/>
+              <a:t>11</a:t>
+            </a:fld>
+            <a:endParaRPr lang="pt-BR"/>
+          </a:p>
+        </p:txBody>
+      </p:sp>
+    </p:spTree>
+    <p:extLst>
+      <p:ext uri="{BB962C8B-B14F-4D97-AF65-F5344CB8AC3E}">
+        <p14:creationId xmlns:p14="http://schemas.microsoft.com/office/powerpoint/2010/main" val="2449924470"/>
+      </p:ext>
+    </p:extLst>
+  </p:cSld>
+  <p:clrMapOvr>
+    <a:masterClrMapping/>
+  </p:clrMapOvr>
+</p:notes>
+</file>
+
 <file path=ppt/slideLayouts/slideLayout1.xml><?xml version="1.0" encoding="utf-8"?>
 <p:sldLayout xmlns:a="http://schemas.openxmlformats.org/drawingml/2006/main" xmlns:r="http://schemas.openxmlformats.org/officeDocument/2006/relationships" xmlns:p="http://schemas.openxmlformats.org/presentationml/2006/main" showMasterSp="0" preserve="1">
   <p:cSld name="External_NI Cover Slide">
@@ -14508,7 +14708,7 @@
           <a:p>
             <a:fld id="{A479B961-B0C3-4F16-8044-1FC7A8EFA7C5}" type="datetimeFigureOut">
               <a:rPr lang="pt-BR" smtClean="0"/>
-              <a:t>22/03/2018</a:t>
+              <a:t>11/05/2018</a:t>
             </a:fld>
             <a:endParaRPr lang="pt-BR"/>
           </a:p>
@@ -14676,7 +14876,7 @@
           <a:p>
             <a:fld id="{A479B961-B0C3-4F16-8044-1FC7A8EFA7C5}" type="datetimeFigureOut">
               <a:rPr lang="pt-BR" smtClean="0"/>
-              <a:t>22/03/2018</a:t>
+              <a:t>11/05/2018</a:t>
             </a:fld>
             <a:endParaRPr lang="pt-BR"/>
           </a:p>
@@ -34323,6 +34523,326 @@
           <a:chExt cx="0" cy="0"/>
         </a:xfrm>
       </p:grpSpPr>
+      <p:sp>
+        <p:nvSpPr>
+          <p:cNvPr id="2" name="Título 1"/>
+          <p:cNvSpPr>
+            <a:spLocks noGrp="1"/>
+          </p:cNvSpPr>
+          <p:nvPr>
+            <p:ph type="title"/>
+          </p:nvPr>
+        </p:nvSpPr>
+        <p:spPr>
+          <a:xfrm>
+            <a:off x="829811" y="423849"/>
+            <a:ext cx="10515600" cy="1325563"/>
+          </a:xfrm>
+        </p:spPr>
+        <p:txBody>
+          <a:bodyPr>
+            <a:normAutofit/>
+          </a:bodyPr>
+          <a:lstStyle/>
+          <a:p>
+            <a:r>
+              <a:rPr lang="pt-BR" dirty="0"/>
+              <a:t>Invite Player</a:t>
+            </a:r>
+          </a:p>
+        </p:txBody>
+      </p:sp>
+      <p:sp>
+        <p:nvSpPr>
+          <p:cNvPr id="4" name="CaixaDeTexto 3"/>
+          <p:cNvSpPr txBox="1"/>
+          <p:nvPr/>
+        </p:nvSpPr>
+        <p:spPr>
+          <a:xfrm>
+            <a:off x="1280605" y="1397929"/>
+            <a:ext cx="6821098" cy="369332"/>
+          </a:xfrm>
+          <a:prstGeom prst="rect">
+            <a:avLst/>
+          </a:prstGeom>
+          <a:noFill/>
+        </p:spPr>
+        <p:txBody>
+          <a:bodyPr wrap="none" rtlCol="0">
+            <a:spAutoFit/>
+          </a:bodyPr>
+          <a:lstStyle/>
+          <a:p>
+            <a:pPr marL="285750" indent="-285750">
+              <a:buFont typeface="Arial" panose="020B0604020202020204" pitchFamily="34" charset="0"/>
+              <a:buChar char="•"/>
+            </a:pPr>
+            <a:r>
+              <a:rPr lang="pt-BR" dirty="0"/>
+              <a:t>Implementação do quarto caso: convidar outro jogador </a:t>
+            </a:r>
+            <a:r>
+              <a:rPr lang="pt-BR" dirty="0" err="1"/>
+              <a:t>logado</a:t>
+            </a:r>
+            <a:endParaRPr lang="pt-BR" dirty="0"/>
+          </a:p>
+        </p:txBody>
+      </p:sp>
+      <p:pic>
+        <p:nvPicPr>
+          <p:cNvPr id="6" name="Espaço Reservado para Conteúdo 4">
+            <a:extLst>
+              <a:ext uri="{FF2B5EF4-FFF2-40B4-BE49-F238E27FC236}">
+                <a16:creationId xmlns:a16="http://schemas.microsoft.com/office/drawing/2014/main" id="{12BEF351-B4B7-498A-A8AB-F19379FD464B}"/>
+              </a:ext>
+            </a:extLst>
+          </p:cNvPr>
+          <p:cNvPicPr>
+            <a:picLocks noGrp="1" noChangeAspect="1"/>
+          </p:cNvPicPr>
+          <p:nvPr>
+            <p:ph idx="1"/>
+          </p:nvPr>
+        </p:nvPicPr>
+        <p:blipFill>
+          <a:blip r:embed="rId3"/>
+          <a:stretch>
+            <a:fillRect/>
+          </a:stretch>
+        </p:blipFill>
+        <p:spPr>
+          <a:xfrm>
+            <a:off x="6595576" y="2900362"/>
+            <a:ext cx="3152775" cy="1057275"/>
+          </a:xfrm>
+          <a:prstGeom prst="rect">
+            <a:avLst/>
+          </a:prstGeom>
+        </p:spPr>
+      </p:pic>
+      <p:pic>
+        <p:nvPicPr>
+          <p:cNvPr id="7" name="Imagem 6">
+            <a:extLst>
+              <a:ext uri="{FF2B5EF4-FFF2-40B4-BE49-F238E27FC236}">
+                <a16:creationId xmlns:a16="http://schemas.microsoft.com/office/drawing/2014/main" id="{B9126464-EE48-446A-A36F-7C41E77F3A80}"/>
+              </a:ext>
+            </a:extLst>
+          </p:cNvPr>
+          <p:cNvPicPr>
+            <a:picLocks noChangeAspect="1"/>
+          </p:cNvPicPr>
+          <p:nvPr/>
+        </p:nvPicPr>
+        <p:blipFill>
+          <a:blip r:embed="rId4"/>
+          <a:stretch>
+            <a:fillRect/>
+          </a:stretch>
+        </p:blipFill>
+        <p:spPr>
+          <a:xfrm>
+            <a:off x="2747767" y="1843963"/>
+            <a:ext cx="3057525" cy="4457700"/>
+          </a:xfrm>
+          <a:prstGeom prst="rect">
+            <a:avLst/>
+          </a:prstGeom>
+        </p:spPr>
+      </p:pic>
+    </p:spTree>
+    <p:extLst>
+      <p:ext uri="{BB962C8B-B14F-4D97-AF65-F5344CB8AC3E}">
+        <p14:creationId xmlns:p14="http://schemas.microsoft.com/office/powerpoint/2010/main" val="157175485"/>
+      </p:ext>
+    </p:extLst>
+  </p:cSld>
+  <p:clrMapOvr>
+    <a:masterClrMapping/>
+  </p:clrMapOvr>
+</p:sld>
+</file>
+
+<file path=ppt/slides/slide11.xml><?xml version="1.0" encoding="utf-8"?>
+<p:sld xmlns:a="http://schemas.openxmlformats.org/drawingml/2006/main" xmlns:r="http://schemas.openxmlformats.org/officeDocument/2006/relationships" xmlns:p="http://schemas.openxmlformats.org/presentationml/2006/main">
+  <p:cSld>
+    <p:spTree>
+      <p:nvGrpSpPr>
+        <p:cNvPr id="1" name=""/>
+        <p:cNvGrpSpPr/>
+        <p:nvPr/>
+      </p:nvGrpSpPr>
+      <p:grpSpPr>
+        <a:xfrm>
+          <a:off x="0" y="0"/>
+          <a:ext cx="0" cy="0"/>
+          <a:chOff x="0" y="0"/>
+          <a:chExt cx="0" cy="0"/>
+        </a:xfrm>
+      </p:grpSpPr>
+      <p:sp>
+        <p:nvSpPr>
+          <p:cNvPr id="2" name="Título 1"/>
+          <p:cNvSpPr>
+            <a:spLocks noGrp="1"/>
+          </p:cNvSpPr>
+          <p:nvPr>
+            <p:ph type="title"/>
+          </p:nvPr>
+        </p:nvSpPr>
+        <p:spPr>
+          <a:xfrm>
+            <a:off x="829811" y="423849"/>
+            <a:ext cx="10515600" cy="1325563"/>
+          </a:xfrm>
+        </p:spPr>
+        <p:txBody>
+          <a:bodyPr>
+            <a:normAutofit/>
+          </a:bodyPr>
+          <a:lstStyle/>
+          <a:p>
+            <a:r>
+              <a:rPr lang="pt-BR" dirty="0" err="1"/>
+              <a:t>Accept</a:t>
+            </a:r>
+            <a:r>
+              <a:rPr lang="pt-BR" dirty="0"/>
+              <a:t> </a:t>
+            </a:r>
+            <a:r>
+              <a:rPr lang="pt-BR" dirty="0" err="1"/>
+              <a:t>invitation</a:t>
+            </a:r>
+            <a:endParaRPr lang="pt-BR" dirty="0"/>
+          </a:p>
+        </p:txBody>
+      </p:sp>
+      <p:sp>
+        <p:nvSpPr>
+          <p:cNvPr id="4" name="CaixaDeTexto 3"/>
+          <p:cNvSpPr txBox="1"/>
+          <p:nvPr/>
+        </p:nvSpPr>
+        <p:spPr>
+          <a:xfrm>
+            <a:off x="1280605" y="1397929"/>
+            <a:ext cx="7334059" cy="369332"/>
+          </a:xfrm>
+          <a:prstGeom prst="rect">
+            <a:avLst/>
+          </a:prstGeom>
+          <a:noFill/>
+        </p:spPr>
+        <p:txBody>
+          <a:bodyPr wrap="none" rtlCol="0">
+            <a:spAutoFit/>
+          </a:bodyPr>
+          <a:lstStyle/>
+          <a:p>
+            <a:pPr marL="285750" indent="-285750">
+              <a:buFont typeface="Arial" panose="020B0604020202020204" pitchFamily="34" charset="0"/>
+              <a:buChar char="•"/>
+            </a:pPr>
+            <a:r>
+              <a:rPr lang="pt-BR" dirty="0"/>
+              <a:t>Implementação do quinto caso: aceitar ou não um convite recebido</a:t>
+            </a:r>
+          </a:p>
+        </p:txBody>
+      </p:sp>
+      <p:pic>
+        <p:nvPicPr>
+          <p:cNvPr id="8" name="Imagem 7">
+            <a:extLst>
+              <a:ext uri="{FF2B5EF4-FFF2-40B4-BE49-F238E27FC236}">
+                <a16:creationId xmlns:a16="http://schemas.microsoft.com/office/drawing/2014/main" id="{0572919A-7EA4-41C3-875A-371A3589A55B}"/>
+              </a:ext>
+            </a:extLst>
+          </p:cNvPr>
+          <p:cNvPicPr>
+            <a:picLocks noChangeAspect="1"/>
+          </p:cNvPicPr>
+          <p:nvPr/>
+        </p:nvPicPr>
+        <p:blipFill>
+          <a:blip r:embed="rId3"/>
+          <a:stretch>
+            <a:fillRect/>
+          </a:stretch>
+        </p:blipFill>
+        <p:spPr>
+          <a:xfrm>
+            <a:off x="875915" y="2079000"/>
+            <a:ext cx="3106627" cy="2700000"/>
+          </a:xfrm>
+          <a:prstGeom prst="rect">
+            <a:avLst/>
+          </a:prstGeom>
+        </p:spPr>
+      </p:pic>
+      <p:pic>
+        <p:nvPicPr>
+          <p:cNvPr id="9" name="Imagem 8">
+            <a:extLst>
+              <a:ext uri="{FF2B5EF4-FFF2-40B4-BE49-F238E27FC236}">
+                <a16:creationId xmlns:a16="http://schemas.microsoft.com/office/drawing/2014/main" id="{18B53F09-2A02-44D7-BD9E-BEDA438A55C8}"/>
+              </a:ext>
+            </a:extLst>
+          </p:cNvPr>
+          <p:cNvPicPr>
+            <a:picLocks noChangeAspect="1"/>
+          </p:cNvPicPr>
+          <p:nvPr/>
+        </p:nvPicPr>
+        <p:blipFill>
+          <a:blip r:embed="rId4"/>
+          <a:stretch>
+            <a:fillRect/>
+          </a:stretch>
+        </p:blipFill>
+        <p:spPr>
+          <a:xfrm>
+            <a:off x="4378465" y="3194151"/>
+            <a:ext cx="7164508" cy="3240000"/>
+          </a:xfrm>
+          <a:prstGeom prst="rect">
+            <a:avLst/>
+          </a:prstGeom>
+        </p:spPr>
+      </p:pic>
+    </p:spTree>
+    <p:extLst>
+      <p:ext uri="{BB962C8B-B14F-4D97-AF65-F5344CB8AC3E}">
+        <p14:creationId xmlns:p14="http://schemas.microsoft.com/office/powerpoint/2010/main" val="4019114395"/>
+      </p:ext>
+    </p:extLst>
+  </p:cSld>
+  <p:clrMapOvr>
+    <a:masterClrMapping/>
+  </p:clrMapOvr>
+</p:sld>
+</file>
+
+<file path=ppt/slides/slide12.xml><?xml version="1.0" encoding="utf-8"?>
+<p:sld xmlns:a="http://schemas.openxmlformats.org/drawingml/2006/main" xmlns:r="http://schemas.openxmlformats.org/officeDocument/2006/relationships" xmlns:p="http://schemas.openxmlformats.org/presentationml/2006/main">
+  <p:cSld>
+    <p:spTree>
+      <p:nvGrpSpPr>
+        <p:cNvPr id="1" name=""/>
+        <p:cNvGrpSpPr/>
+        <p:nvPr/>
+      </p:nvGrpSpPr>
+      <p:grpSpPr>
+        <a:xfrm>
+          <a:off x="0" y="0"/>
+          <a:ext cx="0" cy="0"/>
+          <a:chOff x="0" y="0"/>
+          <a:chExt cx="0" cy="0"/>
+        </a:xfrm>
+      </p:grpSpPr>
     </p:spTree>
     <p:extLst>
       <p:ext uri="{BB962C8B-B14F-4D97-AF65-F5344CB8AC3E}">
@@ -34520,7 +35040,7 @@
             <a:pPr lvl="1"/>
             <a:r>
               <a:rPr lang="pt-BR" sz="2800" dirty="0"/>
-              <a:t>Casos de uso para Jogo da Velha;</a:t>
+              <a:t>Casos de uso propostos;</a:t>
             </a:r>
           </a:p>
           <a:p>
@@ -34534,11 +35054,19 @@
             <a:pPr lvl="1"/>
             <a:r>
               <a:rPr lang="pt-BR" sz="2800" dirty="0"/>
-              <a:t>Demonstração do </a:t>
+              <a:t>Demonstração do caso Invite Player e </a:t>
             </a:r>
             <a:r>
               <a:rPr lang="pt-BR" sz="2800" dirty="0" err="1"/>
-              <a:t>Login</a:t>
+              <a:t>Accept</a:t>
+            </a:r>
+            <a:r>
+              <a:rPr lang="pt-BR" sz="2800" dirty="0"/>
+              <a:t> </a:t>
+            </a:r>
+            <a:r>
+              <a:rPr lang="pt-BR" sz="2800" dirty="0" err="1"/>
+              <a:t>Invitation</a:t>
             </a:r>
             <a:r>
               <a:rPr lang="pt-BR" sz="2800" dirty="0"/>
@@ -35603,13 +36131,8 @@
             </a:pPr>
             <a:r>
               <a:rPr lang="pt-BR" dirty="0"/>
-              <a:t>Implementação do terceiro caso: Desenvolvimento da Interface para </a:t>
-            </a:r>
-            <a:r>
-              <a:rPr lang="pt-BR" dirty="0" err="1"/>
-              <a:t>Login</a:t>
-            </a:r>
-            <a:endParaRPr lang="pt-BR" dirty="0"/>
+              <a:t>Implementação do terceiro caso: Desenvolvimento da Interface para Login</a:t>
+            </a:r>
           </a:p>
           <a:p>
             <a:pPr marL="742950" lvl="1" indent="-285750">

</xml_diff>

<commit_message>
1. Documentação para apresentação do MVP 06
</commit_message>
<xml_diff>
--- a/documentation/MVP - Tic Tac Toe.pptx
+++ b/documentation/MVP - Tic Tac Toe.pptx
@@ -7,7 +7,7 @@
     <p:sldMasterId id="2147483702" r:id="rId3"/>
   </p:sldMasterIdLst>
   <p:notesMasterIdLst>
-    <p:notesMasterId r:id="rId16"/>
+    <p:notesMasterId r:id="rId17"/>
   </p:notesMasterIdLst>
   <p:sldIdLst>
     <p:sldId id="268" r:id="rId4"/>
@@ -21,7 +21,8 @@
     <p:sldId id="274" r:id="rId12"/>
     <p:sldId id="277" r:id="rId13"/>
     <p:sldId id="278" r:id="rId14"/>
-    <p:sldId id="269" r:id="rId15"/>
+    <p:sldId id="279" r:id="rId15"/>
+    <p:sldId id="269" r:id="rId16"/>
   </p:sldIdLst>
   <p:sldSz cx="12192000" cy="6858000"/>
   <p:notesSz cx="6858000" cy="9144000"/>
@@ -136,6 +137,7 @@
             <p14:sldId id="274"/>
             <p14:sldId id="277"/>
             <p14:sldId id="278"/>
+            <p14:sldId id="279"/>
           </p14:sldIdLst>
         </p14:section>
         <p14:section name="Untitled Section" id="{6079A5A3-19BA-42B3-A015-0823992490C3}">
@@ -9227,7 +9229,7 @@
           <a:p>
             <a:fld id="{BAC0F208-0698-41B8-BDE8-AE6BC3AEB68A}" type="datetimeFigureOut">
               <a:rPr lang="pt-BR" smtClean="0"/>
-              <a:t>11/05/2018</a:t>
+              <a:t>06/06/2018</a:t>
             </a:fld>
             <a:endParaRPr lang="pt-BR"/>
           </a:p>
@@ -10063,6 +10065,94 @@
 </p:notes>
 </file>
 
+<file path=ppt/notesSlides/notesSlide7.xml><?xml version="1.0" encoding="utf-8"?>
+<p:notes xmlns:a="http://schemas.openxmlformats.org/drawingml/2006/main" xmlns:r="http://schemas.openxmlformats.org/officeDocument/2006/relationships" xmlns:p="http://schemas.openxmlformats.org/presentationml/2006/main">
+  <p:cSld>
+    <p:spTree>
+      <p:nvGrpSpPr>
+        <p:cNvPr id="1" name=""/>
+        <p:cNvGrpSpPr/>
+        <p:nvPr/>
+      </p:nvGrpSpPr>
+      <p:grpSpPr>
+        <a:xfrm>
+          <a:off x="0" y="0"/>
+          <a:ext cx="0" cy="0"/>
+          <a:chOff x="0" y="0"/>
+          <a:chExt cx="0" cy="0"/>
+        </a:xfrm>
+      </p:grpSpPr>
+      <p:sp>
+        <p:nvSpPr>
+          <p:cNvPr id="2" name="Espaço Reservado para Imagem de Slide 1"/>
+          <p:cNvSpPr>
+            <a:spLocks noGrp="1" noRot="1" noChangeAspect="1"/>
+          </p:cNvSpPr>
+          <p:nvPr>
+            <p:ph type="sldImg"/>
+          </p:nvPr>
+        </p:nvSpPr>
+        <p:spPr/>
+      </p:sp>
+      <p:sp>
+        <p:nvSpPr>
+          <p:cNvPr id="3" name="Espaço Reservado para Anotações 2"/>
+          <p:cNvSpPr>
+            <a:spLocks noGrp="1"/>
+          </p:cNvSpPr>
+          <p:nvPr>
+            <p:ph type="body" idx="1"/>
+          </p:nvPr>
+        </p:nvSpPr>
+        <p:spPr/>
+        <p:txBody>
+          <a:bodyPr/>
+          <a:lstStyle/>
+          <a:p>
+            <a:r>
+              <a:rPr lang="pt-BR"/>
+              <a:t>Permitir que o cliente visualize as duas últimas funções apresentadas de maneira unificada, entregando a possibilidade de jogar com outro player em localização diferente</a:t>
+            </a:r>
+            <a:endParaRPr lang="pt-BR" dirty="0"/>
+          </a:p>
+        </p:txBody>
+      </p:sp>
+      <p:sp>
+        <p:nvSpPr>
+          <p:cNvPr id="4" name="Espaço Reservado para Número de Slide 3"/>
+          <p:cNvSpPr>
+            <a:spLocks noGrp="1"/>
+          </p:cNvSpPr>
+          <p:nvPr>
+            <p:ph type="sldNum" sz="quarter" idx="10"/>
+          </p:nvPr>
+        </p:nvSpPr>
+        <p:spPr/>
+        <p:txBody>
+          <a:bodyPr/>
+          <a:lstStyle/>
+          <a:p>
+            <a:fld id="{CF4D8C66-CD72-4651-ABA9-05CE53648962}" type="slidenum">
+              <a:rPr lang="pt-BR" smtClean="0"/>
+              <a:t>12</a:t>
+            </a:fld>
+            <a:endParaRPr lang="pt-BR"/>
+          </a:p>
+        </p:txBody>
+      </p:sp>
+    </p:spTree>
+    <p:extLst>
+      <p:ext uri="{BB962C8B-B14F-4D97-AF65-F5344CB8AC3E}">
+        <p14:creationId xmlns:p14="http://schemas.microsoft.com/office/powerpoint/2010/main" val="1340409727"/>
+      </p:ext>
+    </p:extLst>
+  </p:cSld>
+  <p:clrMapOvr>
+    <a:masterClrMapping/>
+  </p:clrMapOvr>
+</p:notes>
+</file>
+
 <file path=ppt/slideLayouts/slideLayout1.xml><?xml version="1.0" encoding="utf-8"?>
 <p:sldLayout xmlns:a="http://schemas.openxmlformats.org/drawingml/2006/main" xmlns:r="http://schemas.openxmlformats.org/officeDocument/2006/relationships" xmlns:p="http://schemas.openxmlformats.org/presentationml/2006/main" showMasterSp="0" preserve="1">
   <p:cSld name="External_NI Cover Slide">
@@ -14708,7 +14798,7 @@
           <a:p>
             <a:fld id="{A479B961-B0C3-4F16-8044-1FC7A8EFA7C5}" type="datetimeFigureOut">
               <a:rPr lang="pt-BR" smtClean="0"/>
-              <a:t>11/05/2018</a:t>
+              <a:t>06/06/2018</a:t>
             </a:fld>
             <a:endParaRPr lang="pt-BR"/>
           </a:p>
@@ -14876,7 +14966,7 @@
           <a:p>
             <a:fld id="{A479B961-B0C3-4F16-8044-1FC7A8EFA7C5}" type="datetimeFigureOut">
               <a:rPr lang="pt-BR" smtClean="0"/>
-              <a:t>11/05/2018</a:t>
+              <a:t>06/06/2018</a:t>
             </a:fld>
             <a:endParaRPr lang="pt-BR"/>
           </a:p>
@@ -34827,6 +34917,217 @@
 </file>
 
 <file path=ppt/slides/slide12.xml><?xml version="1.0" encoding="utf-8"?>
+<p:sld xmlns:a="http://schemas.openxmlformats.org/drawingml/2006/main" xmlns:r="http://schemas.openxmlformats.org/officeDocument/2006/relationships" xmlns:p="http://schemas.openxmlformats.org/presentationml/2006/main">
+  <p:cSld>
+    <p:spTree>
+      <p:nvGrpSpPr>
+        <p:cNvPr id="1" name=""/>
+        <p:cNvGrpSpPr/>
+        <p:nvPr/>
+      </p:nvGrpSpPr>
+      <p:grpSpPr>
+        <a:xfrm>
+          <a:off x="0" y="0"/>
+          <a:ext cx="0" cy="0"/>
+          <a:chOff x="0" y="0"/>
+          <a:chExt cx="0" cy="0"/>
+        </a:xfrm>
+      </p:grpSpPr>
+      <p:sp>
+        <p:nvSpPr>
+          <p:cNvPr id="2" name="Título 1"/>
+          <p:cNvSpPr>
+            <a:spLocks noGrp="1"/>
+          </p:cNvSpPr>
+          <p:nvPr>
+            <p:ph type="title"/>
+          </p:nvPr>
+        </p:nvSpPr>
+        <p:spPr>
+          <a:xfrm>
+            <a:off x="829811" y="423849"/>
+            <a:ext cx="10515600" cy="1325563"/>
+          </a:xfrm>
+        </p:spPr>
+        <p:txBody>
+          <a:bodyPr>
+            <a:normAutofit/>
+          </a:bodyPr>
+          <a:lstStyle/>
+          <a:p>
+            <a:r>
+              <a:rPr lang="pt-BR" dirty="0"/>
+              <a:t>Multiplayer Remoto</a:t>
+            </a:r>
+          </a:p>
+        </p:txBody>
+      </p:sp>
+      <p:sp>
+        <p:nvSpPr>
+          <p:cNvPr id="4" name="CaixaDeTexto 3"/>
+          <p:cNvSpPr txBox="1"/>
+          <p:nvPr/>
+        </p:nvSpPr>
+        <p:spPr>
+          <a:xfrm>
+            <a:off x="1280605" y="1397929"/>
+            <a:ext cx="7462299" cy="369332"/>
+          </a:xfrm>
+          <a:prstGeom prst="rect">
+            <a:avLst/>
+          </a:prstGeom>
+          <a:noFill/>
+        </p:spPr>
+        <p:txBody>
+          <a:bodyPr wrap="none" rtlCol="0">
+            <a:spAutoFit/>
+          </a:bodyPr>
+          <a:lstStyle/>
+          <a:p>
+            <a:pPr marL="285750" indent="-285750">
+              <a:buFont typeface="Arial" panose="020B0604020202020204" pitchFamily="34" charset="0"/>
+              <a:buChar char="•"/>
+            </a:pPr>
+            <a:r>
+              <a:rPr lang="pt-BR" dirty="0"/>
+              <a:t>Implementação do sexto caso: jogar uma partida de maneira remota</a:t>
+            </a:r>
+          </a:p>
+        </p:txBody>
+      </p:sp>
+      <p:pic>
+        <p:nvPicPr>
+          <p:cNvPr id="9" name="Imagem 8">
+            <a:extLst>
+              <a:ext uri="{FF2B5EF4-FFF2-40B4-BE49-F238E27FC236}">
+                <a16:creationId xmlns:a16="http://schemas.microsoft.com/office/drawing/2014/main" id="{18B53F09-2A02-44D7-BD9E-BEDA438A55C8}"/>
+              </a:ext>
+            </a:extLst>
+          </p:cNvPr>
+          <p:cNvPicPr>
+            <a:picLocks noChangeAspect="1"/>
+          </p:cNvPicPr>
+          <p:nvPr/>
+        </p:nvPicPr>
+        <p:blipFill>
+          <a:blip r:embed="rId3"/>
+          <a:stretch>
+            <a:fillRect/>
+          </a:stretch>
+        </p:blipFill>
+        <p:spPr>
+          <a:xfrm>
+            <a:off x="5666090" y="3802225"/>
+            <a:ext cx="6368452" cy="2880000"/>
+          </a:xfrm>
+          <a:prstGeom prst="rect">
+            <a:avLst/>
+          </a:prstGeom>
+        </p:spPr>
+      </p:pic>
+      <p:pic>
+        <p:nvPicPr>
+          <p:cNvPr id="3" name="Imagem 2">
+            <a:extLst>
+              <a:ext uri="{FF2B5EF4-FFF2-40B4-BE49-F238E27FC236}">
+                <a16:creationId xmlns:a16="http://schemas.microsoft.com/office/drawing/2014/main" id="{BBB5BA5F-E3AE-48EA-B737-FD03A91741D6}"/>
+              </a:ext>
+            </a:extLst>
+          </p:cNvPr>
+          <p:cNvPicPr>
+            <a:picLocks noChangeAspect="1"/>
+          </p:cNvPicPr>
+          <p:nvPr/>
+        </p:nvPicPr>
+        <p:blipFill rotWithShape="1">
+          <a:blip r:embed="rId4"/>
+          <a:srcRect l="5558" t="10117" r="7625" b="7645"/>
+          <a:stretch/>
+        </p:blipFill>
+        <p:spPr>
+          <a:xfrm>
+            <a:off x="3051112" y="1913492"/>
+            <a:ext cx="2947731" cy="1620000"/>
+          </a:xfrm>
+          <a:prstGeom prst="rect">
+            <a:avLst/>
+          </a:prstGeom>
+        </p:spPr>
+      </p:pic>
+      <p:pic>
+        <p:nvPicPr>
+          <p:cNvPr id="5" name="Imagem 4">
+            <a:extLst>
+              <a:ext uri="{FF2B5EF4-FFF2-40B4-BE49-F238E27FC236}">
+                <a16:creationId xmlns:a16="http://schemas.microsoft.com/office/drawing/2014/main" id="{AC1D61B4-576C-4C8C-BB2E-BA67A534D2C3}"/>
+              </a:ext>
+            </a:extLst>
+          </p:cNvPr>
+          <p:cNvPicPr>
+            <a:picLocks noChangeAspect="1"/>
+          </p:cNvPicPr>
+          <p:nvPr/>
+        </p:nvPicPr>
+        <p:blipFill>
+          <a:blip r:embed="rId5"/>
+          <a:stretch>
+            <a:fillRect/>
+          </a:stretch>
+        </p:blipFill>
+        <p:spPr>
+          <a:xfrm>
+            <a:off x="335903" y="3622225"/>
+            <a:ext cx="2530177" cy="1620000"/>
+          </a:xfrm>
+          <a:prstGeom prst="rect">
+            <a:avLst/>
+          </a:prstGeom>
+        </p:spPr>
+      </p:pic>
+      <p:pic>
+        <p:nvPicPr>
+          <p:cNvPr id="6" name="Imagem 5">
+            <a:extLst>
+              <a:ext uri="{FF2B5EF4-FFF2-40B4-BE49-F238E27FC236}">
+                <a16:creationId xmlns:a16="http://schemas.microsoft.com/office/drawing/2014/main" id="{EC09A4D6-F89C-4B76-869D-5C6D12F5EB5F}"/>
+              </a:ext>
+            </a:extLst>
+          </p:cNvPr>
+          <p:cNvPicPr>
+            <a:picLocks noChangeAspect="1"/>
+          </p:cNvPicPr>
+          <p:nvPr/>
+        </p:nvPicPr>
+        <p:blipFill>
+          <a:blip r:embed="rId6"/>
+          <a:stretch>
+            <a:fillRect/>
+          </a:stretch>
+        </p:blipFill>
+        <p:spPr>
+          <a:xfrm>
+            <a:off x="3226085" y="4902944"/>
+            <a:ext cx="2080000" cy="1620000"/>
+          </a:xfrm>
+          <a:prstGeom prst="rect">
+            <a:avLst/>
+          </a:prstGeom>
+        </p:spPr>
+      </p:pic>
+    </p:spTree>
+    <p:extLst>
+      <p:ext uri="{BB962C8B-B14F-4D97-AF65-F5344CB8AC3E}">
+        <p14:creationId xmlns:p14="http://schemas.microsoft.com/office/powerpoint/2010/main" val="1063708082"/>
+      </p:ext>
+    </p:extLst>
+  </p:cSld>
+  <p:clrMapOvr>
+    <a:masterClrMapping/>
+  </p:clrMapOvr>
+</p:sld>
+</file>
+
+<file path=ppt/slides/slide13.xml><?xml version="1.0" encoding="utf-8"?>
 <p:sld xmlns:a="http://schemas.openxmlformats.org/drawingml/2006/main" xmlns:r="http://schemas.openxmlformats.org/officeDocument/2006/relationships" xmlns:p="http://schemas.openxmlformats.org/presentationml/2006/main">
   <p:cSld>
     <p:spTree>

</xml_diff>

<commit_message>
1. Apresentação MVP 06
</commit_message>
<xml_diff>
--- a/documentation/MVP - Tic Tac Toe.pptx
+++ b/documentation/MVP - Tic Tac Toe.pptx
@@ -9229,7 +9229,7 @@
           <a:p>
             <a:fld id="{BAC0F208-0698-41B8-BDE8-AE6BC3AEB68A}" type="datetimeFigureOut">
               <a:rPr lang="pt-BR" smtClean="0"/>
-              <a:t>06/06/2018</a:t>
+              <a:t>07/06/2018</a:t>
             </a:fld>
             <a:endParaRPr lang="pt-BR"/>
           </a:p>
@@ -14798,7 +14798,7 @@
           <a:p>
             <a:fld id="{A479B961-B0C3-4F16-8044-1FC7A8EFA7C5}" type="datetimeFigureOut">
               <a:rPr lang="pt-BR" smtClean="0"/>
-              <a:t>06/06/2018</a:t>
+              <a:t>07/06/2018</a:t>
             </a:fld>
             <a:endParaRPr lang="pt-BR"/>
           </a:p>
@@ -14966,7 +14966,7 @@
           <a:p>
             <a:fld id="{A479B961-B0C3-4F16-8044-1FC7A8EFA7C5}" type="datetimeFigureOut">
               <a:rPr lang="pt-BR" smtClean="0"/>
-              <a:t>06/06/2018</a:t>
+              <a:t>07/06/2018</a:t>
             </a:fld>
             <a:endParaRPr lang="pt-BR"/>
           </a:p>
@@ -34997,36 +34997,6 @@
       </p:sp>
       <p:pic>
         <p:nvPicPr>
-          <p:cNvPr id="9" name="Imagem 8">
-            <a:extLst>
-              <a:ext uri="{FF2B5EF4-FFF2-40B4-BE49-F238E27FC236}">
-                <a16:creationId xmlns:a16="http://schemas.microsoft.com/office/drawing/2014/main" id="{18B53F09-2A02-44D7-BD9E-BEDA438A55C8}"/>
-              </a:ext>
-            </a:extLst>
-          </p:cNvPr>
-          <p:cNvPicPr>
-            <a:picLocks noChangeAspect="1"/>
-          </p:cNvPicPr>
-          <p:nvPr/>
-        </p:nvPicPr>
-        <p:blipFill>
-          <a:blip r:embed="rId3"/>
-          <a:stretch>
-            <a:fillRect/>
-          </a:stretch>
-        </p:blipFill>
-        <p:spPr>
-          <a:xfrm>
-            <a:off x="5666090" y="3802225"/>
-            <a:ext cx="6368452" cy="2880000"/>
-          </a:xfrm>
-          <a:prstGeom prst="rect">
-            <a:avLst/>
-          </a:prstGeom>
-        </p:spPr>
-      </p:pic>
-      <p:pic>
-        <p:nvPicPr>
           <p:cNvPr id="3" name="Imagem 2">
             <a:extLst>
               <a:ext uri="{FF2B5EF4-FFF2-40B4-BE49-F238E27FC236}">
@@ -35040,7 +35010,7 @@
           <p:nvPr/>
         </p:nvPicPr>
         <p:blipFill rotWithShape="1">
-          <a:blip r:embed="rId4"/>
+          <a:blip r:embed="rId3"/>
           <a:srcRect l="5558" t="10117" r="7625" b="7645"/>
           <a:stretch/>
         </p:blipFill>
@@ -35069,7 +35039,7 @@
           <p:nvPr/>
         </p:nvPicPr>
         <p:blipFill>
-          <a:blip r:embed="rId5"/>
+          <a:blip r:embed="rId4"/>
           <a:stretch>
             <a:fillRect/>
           </a:stretch>
@@ -35099,7 +35069,7 @@
           <p:nvPr/>
         </p:nvPicPr>
         <p:blipFill>
-          <a:blip r:embed="rId6"/>
+          <a:blip r:embed="rId5"/>
           <a:stretch>
             <a:fillRect/>
           </a:stretch>
@@ -35108,6 +35078,36 @@
           <a:xfrm>
             <a:off x="3226085" y="4902944"/>
             <a:ext cx="2080000" cy="1620000"/>
+          </a:xfrm>
+          <a:prstGeom prst="rect">
+            <a:avLst/>
+          </a:prstGeom>
+        </p:spPr>
+      </p:pic>
+      <p:pic>
+        <p:nvPicPr>
+          <p:cNvPr id="7" name="Imagem 6">
+            <a:extLst>
+              <a:ext uri="{FF2B5EF4-FFF2-40B4-BE49-F238E27FC236}">
+                <a16:creationId xmlns:a16="http://schemas.microsoft.com/office/drawing/2014/main" id="{91734220-6327-4CAE-88AE-EA3A1F6DBA34}"/>
+              </a:ext>
+            </a:extLst>
+          </p:cNvPr>
+          <p:cNvPicPr>
+            <a:picLocks noChangeAspect="1"/>
+          </p:cNvPicPr>
+          <p:nvPr/>
+        </p:nvPicPr>
+        <p:blipFill>
+          <a:blip r:embed="rId6"/>
+          <a:stretch>
+            <a:fillRect/>
+          </a:stretch>
+        </p:blipFill>
+        <p:spPr>
+          <a:xfrm>
+            <a:off x="5558585" y="3622225"/>
+            <a:ext cx="6297512" cy="2880000"/>
           </a:xfrm>
           <a:prstGeom prst="rect">
             <a:avLst/>
@@ -35355,23 +35355,7 @@
             <a:pPr lvl="1"/>
             <a:r>
               <a:rPr lang="pt-BR" sz="2800" dirty="0"/>
-              <a:t>Demonstração do caso Invite Player e </a:t>
-            </a:r>
-            <a:r>
-              <a:rPr lang="pt-BR" sz="2800" dirty="0" err="1"/>
-              <a:t>Accept</a:t>
-            </a:r>
-            <a:r>
-              <a:rPr lang="pt-BR" sz="2800" dirty="0"/>
-              <a:t> </a:t>
-            </a:r>
-            <a:r>
-              <a:rPr lang="pt-BR" sz="2800" dirty="0" err="1"/>
-              <a:t>Invitation</a:t>
-            </a:r>
-            <a:r>
-              <a:rPr lang="pt-BR" sz="2800" dirty="0"/>
-              <a:t>;</a:t>
+              <a:t>Demonstração do caso Multiplayer Remoto;</a:t>
             </a:r>
           </a:p>
           <a:p>

</xml_diff>